<commit_message>
update to ch 4
</commit_message>
<xml_diff>
--- a/docs/slides/nnintro-ch4.pptx
+++ b/docs/slides/nnintro-ch4.pptx
@@ -231,7 +231,7 @@
           <a:p>
             <a:fld id="{B01994EC-483D-324E-A14B-FCB2363A6145}" type="datetimeFigureOut">
               <a:rPr lang="en-US" smtClean="0"/>
-              <a:t>10/9/24</a:t>
+              <a:t>10/10/24</a:t>
             </a:fld>
             <a:endParaRPr lang="en-US"/>
           </a:p>
@@ -397,7 +397,7 @@
           <a:p>
             <a:fld id="{14CAC850-72E3-3F4D-B35F-F73F8A3CE0A9}" type="datetimeFigureOut">
               <a:rPr lang="en-US" smtClean="0"/>
-              <a:t>10/9/24</a:t>
+              <a:t>10/10/24</a:t>
             </a:fld>
             <a:endParaRPr lang="en-US"/>
           </a:p>
@@ -928,7 +928,7 @@
           <a:p>
             <a:fld id="{0B7FF8D0-70A2-2644-AB9A-71B243683867}" type="datetime1">
               <a:rPr lang="en-US" smtClean="0"/>
-              <a:t>10/9/24</a:t>
+              <a:t>10/10/24</a:t>
             </a:fld>
             <a:endParaRPr lang="en-US"/>
           </a:p>
@@ -1131,7 +1131,7 @@
           <a:p>
             <a:fld id="{103ADB3E-F530-B04E-9C00-73A665A746DF}" type="datetime1">
               <a:rPr lang="en-US" smtClean="0"/>
-              <a:t>10/9/24</a:t>
+              <a:t>10/10/24</a:t>
             </a:fld>
             <a:endParaRPr lang="en-US"/>
           </a:p>
@@ -1344,7 +1344,7 @@
           <a:p>
             <a:fld id="{29AA8647-DDC8-8045-929B-87F8A0123AAC}" type="datetime1">
               <a:rPr lang="en-US" smtClean="0"/>
-              <a:t>10/9/24</a:t>
+              <a:t>10/10/24</a:t>
             </a:fld>
             <a:endParaRPr lang="en-US"/>
           </a:p>
@@ -1854,7 +1854,7 @@
           <a:p>
             <a:fld id="{0E798730-4C36-8843-9EA4-9C3064893DBD}" type="datetime1">
               <a:rPr lang="en-US" smtClean="0"/>
-              <a:t>10/9/24</a:t>
+              <a:t>10/10/24</a:t>
             </a:fld>
             <a:endParaRPr lang="en-US"/>
           </a:p>
@@ -2134,7 +2134,7 @@
           <a:p>
             <a:fld id="{1D207688-05DA-4D47-AA55-61A105CE9D81}" type="datetime1">
               <a:rPr lang="en-US" smtClean="0"/>
-              <a:t>10/9/24</a:t>
+              <a:t>10/10/24</a:t>
             </a:fld>
             <a:endParaRPr lang="en-US"/>
           </a:p>
@@ -2419,7 +2419,7 @@
           <a:p>
             <a:fld id="{F3AF4D28-8309-FE49-AB2C-BE2DC70C9A1C}" type="datetime1">
               <a:rPr lang="en-US" smtClean="0"/>
-              <a:t>10/9/24</a:t>
+              <a:t>10/10/24</a:t>
             </a:fld>
             <a:endParaRPr lang="en-US"/>
           </a:p>
@@ -2873,7 +2873,7 @@
           <a:p>
             <a:fld id="{93C85934-7B0D-E641-970A-4611A6D96867}" type="datetime1">
               <a:rPr lang="en-US" smtClean="0"/>
-              <a:t>10/9/24</a:t>
+              <a:t>10/10/24</a:t>
             </a:fld>
             <a:endParaRPr lang="en-US"/>
           </a:p>
@@ -3030,7 +3030,7 @@
           <a:p>
             <a:fld id="{9E954B22-D73B-5641-AE5B-A44D888704A2}" type="datetime1">
               <a:rPr lang="en-US" smtClean="0"/>
-              <a:t>10/9/24</a:t>
+              <a:t>10/10/24</a:t>
             </a:fld>
             <a:endParaRPr lang="en-US"/>
           </a:p>
@@ -3160,7 +3160,7 @@
           <a:p>
             <a:fld id="{FAF56C4A-8140-4243-9F4B-6A0F328069B3}" type="datetime1">
               <a:rPr lang="en-US" smtClean="0"/>
-              <a:t>10/9/24</a:t>
+              <a:t>10/10/24</a:t>
             </a:fld>
             <a:endParaRPr lang="en-US"/>
           </a:p>
@@ -3435,7 +3435,7 @@
           <a:p>
             <a:fld id="{0AB7471A-7A79-1F42-B8F4-4C366A4D2860}" type="datetime1">
               <a:rPr lang="en-US" smtClean="0"/>
-              <a:t>10/9/24</a:t>
+              <a:t>10/10/24</a:t>
             </a:fld>
             <a:endParaRPr lang="en-US"/>
           </a:p>
@@ -3687,7 +3687,7 @@
           <a:p>
             <a:fld id="{8F7C599A-C565-AA4F-B0B7-B1C9F3E19B32}" type="datetime1">
               <a:rPr lang="en-US" smtClean="0"/>
-              <a:t>10/9/24</a:t>
+              <a:t>10/10/24</a:t>
             </a:fld>
             <a:endParaRPr lang="en-US"/>
           </a:p>
@@ -3898,7 +3898,7 @@
           <a:p>
             <a:fld id="{07193804-F157-E84E-A058-6F1D58E71D89}" type="datetime1">
               <a:rPr lang="en-US" smtClean="0"/>
-              <a:t>10/9/24</a:t>
+              <a:t>10/10/24</a:t>
             </a:fld>
             <a:endParaRPr lang="en-US"/>
           </a:p>
@@ -5183,7 +5183,7 @@
         </p:nvSpPr>
         <p:spPr>
           <a:xfrm>
-            <a:off x="5473082" y="1795758"/>
+            <a:off x="5461214" y="1836717"/>
             <a:ext cx="2979057" cy="3590003"/>
           </a:xfrm>
           <a:prstGeom prst="wedgeRoundRectCallout">
@@ -5939,7 +5939,7 @@
           <a:p>
             <a:r>
               <a:rPr lang="en-US" dirty="0"/>
-              <a:t>All the tensor that </a:t>
+              <a:t>All the tensors that </a:t>
             </a:r>
             <a:r>
               <a:rPr lang="en-US" dirty="0" err="1"/>

</xml_diff>